<commit_message>
add latest version for webinar 2
</commit_message>
<xml_diff>
--- a/Rmd/covid_cases.pptx
+++ b/Rmd/covid_cases.pptx
@@ -3276,7 +3276,7 @@
             </a:pPr>
             <a:r>
               <a:rPr/>
-              <a:t>r</a:t>
+              <a:t>2020-06-19</a:t>
             </a:r>
             <a:r>
               <a:rPr/>
@@ -3284,7 +3284,7 @@
             </a:r>
             <a:r>
               <a:rPr/>
-              <a:t>Sys.time()</a:t>
+              <a:t>08:52:26</a:t>
             </a:r>
           </a:p>
         </p:txBody>

</xml_diff>